<commit_message>
audio detection attached to the main.py, ready for testing
</commit_message>
<xml_diff>
--- a/report/report.pptx
+++ b/report/report.pptx
@@ -7,8 +7,10 @@
   <p:sldIdLst>
     <p:sldId id="258" r:id="rId2"/>
     <p:sldId id="259" r:id="rId3"/>
-    <p:sldId id="256" r:id="rId4"/>
-    <p:sldId id="257" r:id="rId5"/>
+    <p:sldId id="261" r:id="rId4"/>
+    <p:sldId id="256" r:id="rId5"/>
+    <p:sldId id="257" r:id="rId6"/>
+    <p:sldId id="260" r:id="rId7"/>
   </p:sldIdLst>
   <p:sldSz cx="12192000" cy="6858000"/>
   <p:notesSz cx="6858000" cy="9144000"/>
@@ -264,7 +266,7 @@
           <a:p>
             <a:fld id="{F2387B36-822F-4AF9-A5FE-F910406F2963}" type="datetimeFigureOut">
               <a:rPr lang="en-US" smtClean="0"/>
-              <a:t>9/8/2021</a:t>
+              <a:t>9/16/2021</a:t>
             </a:fld>
             <a:endParaRPr lang="en-US"/>
           </a:p>
@@ -464,7 +466,7 @@
           <a:p>
             <a:fld id="{F2387B36-822F-4AF9-A5FE-F910406F2963}" type="datetimeFigureOut">
               <a:rPr lang="en-US" smtClean="0"/>
-              <a:t>9/8/2021</a:t>
+              <a:t>9/16/2021</a:t>
             </a:fld>
             <a:endParaRPr lang="en-US"/>
           </a:p>
@@ -674,7 +676,7 @@
           <a:p>
             <a:fld id="{F2387B36-822F-4AF9-A5FE-F910406F2963}" type="datetimeFigureOut">
               <a:rPr lang="en-US" smtClean="0"/>
-              <a:t>9/8/2021</a:t>
+              <a:t>9/16/2021</a:t>
             </a:fld>
             <a:endParaRPr lang="en-US"/>
           </a:p>
@@ -874,7 +876,7 @@
           <a:p>
             <a:fld id="{F2387B36-822F-4AF9-A5FE-F910406F2963}" type="datetimeFigureOut">
               <a:rPr lang="en-US" smtClean="0"/>
-              <a:t>9/8/2021</a:t>
+              <a:t>9/16/2021</a:t>
             </a:fld>
             <a:endParaRPr lang="en-US"/>
           </a:p>
@@ -1150,7 +1152,7 @@
           <a:p>
             <a:fld id="{F2387B36-822F-4AF9-A5FE-F910406F2963}" type="datetimeFigureOut">
               <a:rPr lang="en-US" smtClean="0"/>
-              <a:t>9/8/2021</a:t>
+              <a:t>9/16/2021</a:t>
             </a:fld>
             <a:endParaRPr lang="en-US"/>
           </a:p>
@@ -1418,7 +1420,7 @@
           <a:p>
             <a:fld id="{F2387B36-822F-4AF9-A5FE-F910406F2963}" type="datetimeFigureOut">
               <a:rPr lang="en-US" smtClean="0"/>
-              <a:t>9/8/2021</a:t>
+              <a:t>9/16/2021</a:t>
             </a:fld>
             <a:endParaRPr lang="en-US"/>
           </a:p>
@@ -1833,7 +1835,7 @@
           <a:p>
             <a:fld id="{F2387B36-822F-4AF9-A5FE-F910406F2963}" type="datetimeFigureOut">
               <a:rPr lang="en-US" smtClean="0"/>
-              <a:t>9/8/2021</a:t>
+              <a:t>9/16/2021</a:t>
             </a:fld>
             <a:endParaRPr lang="en-US"/>
           </a:p>
@@ -1975,7 +1977,7 @@
           <a:p>
             <a:fld id="{F2387B36-822F-4AF9-A5FE-F910406F2963}" type="datetimeFigureOut">
               <a:rPr lang="en-US" smtClean="0"/>
-              <a:t>9/8/2021</a:t>
+              <a:t>9/16/2021</a:t>
             </a:fld>
             <a:endParaRPr lang="en-US"/>
           </a:p>
@@ -2088,7 +2090,7 @@
           <a:p>
             <a:fld id="{F2387B36-822F-4AF9-A5FE-F910406F2963}" type="datetimeFigureOut">
               <a:rPr lang="en-US" smtClean="0"/>
-              <a:t>9/8/2021</a:t>
+              <a:t>9/16/2021</a:t>
             </a:fld>
             <a:endParaRPr lang="en-US"/>
           </a:p>
@@ -2401,7 +2403,7 @@
           <a:p>
             <a:fld id="{F2387B36-822F-4AF9-A5FE-F910406F2963}" type="datetimeFigureOut">
               <a:rPr lang="en-US" smtClean="0"/>
-              <a:t>9/8/2021</a:t>
+              <a:t>9/16/2021</a:t>
             </a:fld>
             <a:endParaRPr lang="en-US"/>
           </a:p>
@@ -2690,7 +2692,7 @@
           <a:p>
             <a:fld id="{F2387B36-822F-4AF9-A5FE-F910406F2963}" type="datetimeFigureOut">
               <a:rPr lang="en-US" smtClean="0"/>
-              <a:t>9/8/2021</a:t>
+              <a:t>9/16/2021</a:t>
             </a:fld>
             <a:endParaRPr lang="en-US"/>
           </a:p>
@@ -2933,7 +2935,7 @@
           <a:p>
             <a:fld id="{F2387B36-822F-4AF9-A5FE-F910406F2963}" type="datetimeFigureOut">
               <a:rPr lang="en-US" smtClean="0"/>
-              <a:t>9/8/2021</a:t>
+              <a:t>9/16/2021</a:t>
             </a:fld>
             <a:endParaRPr lang="en-US"/>
           </a:p>
@@ -3336,6 +3338,14 @@
 <file path=ppt/slides/slide1.xml><?xml version="1.0" encoding="utf-8"?>
 <p:sld xmlns:a="http://schemas.openxmlformats.org/drawingml/2006/main" xmlns:r="http://schemas.openxmlformats.org/officeDocument/2006/relationships" xmlns:p="http://schemas.openxmlformats.org/presentationml/2006/main">
   <p:cSld>
+    <p:bg>
+      <p:bgPr>
+        <a:solidFill>
+          <a:schemeClr val="tx1"/>
+        </a:solidFill>
+        <a:effectLst/>
+      </p:bgPr>
+    </p:bg>
     <p:spTree>
       <p:nvGrpSpPr>
         <p:cNvPr id="1" name=""/>
@@ -4522,6 +4532,14 @@
 <file path=ppt/slides/slide2.xml><?xml version="1.0" encoding="utf-8"?>
 <p:sld xmlns:a="http://schemas.openxmlformats.org/drawingml/2006/main" xmlns:r="http://schemas.openxmlformats.org/officeDocument/2006/relationships" xmlns:p="http://schemas.openxmlformats.org/presentationml/2006/main">
   <p:cSld>
+    <p:bg>
+      <p:bgPr>
+        <a:solidFill>
+          <a:schemeClr val="tx1"/>
+        </a:solidFill>
+        <a:effectLst/>
+      </p:bgPr>
+    </p:bg>
     <p:spTree>
       <p:nvGrpSpPr>
         <p:cNvPr id="1" name=""/>
@@ -4565,14 +4583,26 @@
           <a:lstStyle/>
           <a:p>
             <a:r>
-              <a:rPr lang="en-US" sz="2800" dirty="0"/>
+              <a:rPr lang="en-US" sz="2800" dirty="0">
+                <a:solidFill>
+                  <a:schemeClr val="bg1"/>
+                </a:solidFill>
+              </a:rPr>
               <a:t>Flow Chart </a:t>
             </a:r>
             <a:r>
-              <a:rPr lang="zh-CN" altLang="en-US" sz="2800" dirty="0"/>
+              <a:rPr lang="zh-CN" altLang="en-US" sz="2800" dirty="0">
+                <a:solidFill>
+                  <a:schemeClr val="bg1"/>
+                </a:solidFill>
+              </a:rPr>
               <a:t>流程图</a:t>
             </a:r>
-            <a:endParaRPr lang="en-US" sz="2800" dirty="0"/>
+            <a:endParaRPr lang="en-US" sz="2800" dirty="0">
+              <a:solidFill>
+                <a:schemeClr val="bg1"/>
+              </a:solidFill>
+            </a:endParaRPr>
           </a:p>
         </p:txBody>
       </p:sp>
@@ -4592,6 +4622,251 @@
 <file path=ppt/slides/slide3.xml><?xml version="1.0" encoding="utf-8"?>
 <p:sld xmlns:a="http://schemas.openxmlformats.org/drawingml/2006/main" xmlns:r="http://schemas.openxmlformats.org/officeDocument/2006/relationships" xmlns:p="http://schemas.openxmlformats.org/presentationml/2006/main">
   <p:cSld>
+    <p:bg>
+      <p:bgPr>
+        <a:solidFill>
+          <a:schemeClr val="tx1"/>
+        </a:solidFill>
+        <a:effectLst/>
+      </p:bgPr>
+    </p:bg>
+    <p:spTree>
+      <p:nvGrpSpPr>
+        <p:cNvPr id="1" name=""/>
+        <p:cNvGrpSpPr/>
+        <p:nvPr/>
+      </p:nvGrpSpPr>
+      <p:grpSpPr>
+        <a:xfrm>
+          <a:off x="0" y="0"/>
+          <a:ext cx="0" cy="0"/>
+          <a:chOff x="0" y="0"/>
+          <a:chExt cx="0" cy="0"/>
+        </a:xfrm>
+      </p:grpSpPr>
+      <p:sp>
+        <p:nvSpPr>
+          <p:cNvPr id="2" name="标题 1">
+            <a:extLst>
+              <a:ext uri="{FF2B5EF4-FFF2-40B4-BE49-F238E27FC236}">
+                <a16:creationId xmlns:a16="http://schemas.microsoft.com/office/drawing/2014/main" id="{075BC476-6E42-4D86-A8D3-64023A48CBEB}"/>
+              </a:ext>
+            </a:extLst>
+          </p:cNvPr>
+          <p:cNvSpPr>
+            <a:spLocks noGrp="1"/>
+          </p:cNvSpPr>
+          <p:nvPr>
+            <p:ph type="title"/>
+          </p:nvPr>
+        </p:nvSpPr>
+        <p:spPr/>
+        <p:txBody>
+          <a:bodyPr/>
+          <a:lstStyle/>
+          <a:p>
+            <a:r>
+              <a:rPr lang="en-US" altLang="zh-CN" dirty="0">
+                <a:solidFill>
+                  <a:schemeClr val="bg1"/>
+                </a:solidFill>
+              </a:rPr>
+              <a:t>Click Area</a:t>
+            </a:r>
+            <a:r>
+              <a:rPr lang="en-US" dirty="0">
+                <a:solidFill>
+                  <a:schemeClr val="bg1"/>
+                </a:solidFill>
+              </a:rPr>
+              <a:t> Detection </a:t>
+            </a:r>
+            <a:r>
+              <a:rPr lang="zh-CN" altLang="en-US" dirty="0">
+                <a:solidFill>
+                  <a:schemeClr val="bg1"/>
+                </a:solidFill>
+              </a:rPr>
+              <a:t>高价值区域检测与点击</a:t>
+            </a:r>
+            <a:endParaRPr lang="en-US" dirty="0">
+              <a:solidFill>
+                <a:schemeClr val="bg1"/>
+              </a:solidFill>
+            </a:endParaRPr>
+          </a:p>
+        </p:txBody>
+      </p:sp>
+      <p:sp>
+        <p:nvSpPr>
+          <p:cNvPr id="3" name="内容占位符 2">
+            <a:extLst>
+              <a:ext uri="{FF2B5EF4-FFF2-40B4-BE49-F238E27FC236}">
+                <a16:creationId xmlns:a16="http://schemas.microsoft.com/office/drawing/2014/main" id="{FB675EDC-9722-45D3-A1FA-63EF0C085B64}"/>
+              </a:ext>
+            </a:extLst>
+          </p:cNvPr>
+          <p:cNvSpPr>
+            <a:spLocks noGrp="1"/>
+          </p:cNvSpPr>
+          <p:nvPr>
+            <p:ph idx="1"/>
+          </p:nvPr>
+        </p:nvSpPr>
+        <p:spPr/>
+        <p:txBody>
+          <a:bodyPr/>
+          <a:lstStyle/>
+          <a:p>
+            <a:pPr marL="0" indent="0">
+              <a:buNone/>
+            </a:pPr>
+            <a:r>
+              <a:rPr lang="en-US" dirty="0">
+                <a:solidFill>
+                  <a:schemeClr val="bg1"/>
+                </a:solidFill>
+              </a:rPr>
+              <a:t>The Bai Ci Zhan App has multiple sorts of visual questions that allows the users to reinforce their vocabulary, including:</a:t>
+            </a:r>
+          </a:p>
+          <a:p>
+            <a:pPr>
+              <a:buFontTx/>
+              <a:buChar char="-"/>
+            </a:pPr>
+            <a:r>
+              <a:rPr lang="en-US" dirty="0">
+                <a:solidFill>
+                  <a:schemeClr val="bg1"/>
+                </a:solidFill>
+              </a:rPr>
+              <a:t>Picking matching pictures upon seeing different words,</a:t>
+            </a:r>
+          </a:p>
+          <a:p>
+            <a:pPr>
+              <a:buFontTx/>
+              <a:buChar char="-"/>
+            </a:pPr>
+            <a:r>
+              <a:rPr lang="en-US" dirty="0">
+                <a:solidFill>
+                  <a:schemeClr val="bg1"/>
+                </a:solidFill>
+              </a:rPr>
+              <a:t>Choosing the most </a:t>
+            </a:r>
+            <a:r>
+              <a:rPr lang="en-US" altLang="zh-CN" dirty="0">
+                <a:solidFill>
+                  <a:schemeClr val="bg1"/>
+                </a:solidFill>
+              </a:rPr>
+              <a:t>germane</a:t>
+            </a:r>
+            <a:r>
+              <a:rPr lang="en-US" dirty="0">
+                <a:solidFill>
+                  <a:schemeClr val="bg1"/>
+                </a:solidFill>
+              </a:rPr>
+              <a:t> explanation in Chinese.</a:t>
+            </a:r>
+          </a:p>
+          <a:p>
+            <a:pPr>
+              <a:buFontTx/>
+              <a:buChar char="-"/>
+            </a:pPr>
+            <a:endParaRPr lang="en-US" dirty="0">
+              <a:solidFill>
+                <a:schemeClr val="bg1"/>
+              </a:solidFill>
+            </a:endParaRPr>
+          </a:p>
+          <a:p>
+            <a:pPr marL="0" indent="0">
+              <a:buNone/>
+            </a:pPr>
+            <a:r>
+              <a:rPr lang="en-US" dirty="0">
+                <a:solidFill>
+                  <a:schemeClr val="bg1"/>
+                </a:solidFill>
+              </a:rPr>
+              <a:t>Apart from the different kinds of questions, we must also deal with the continue button  				that would jump out from time to time </a:t>
+            </a:r>
+            <a:r>
+              <a:rPr lang="en-US">
+                <a:solidFill>
+                  <a:schemeClr val="bg1"/>
+                </a:solidFill>
+              </a:rPr>
+              <a:t>between questions </a:t>
+            </a:r>
+            <a:endParaRPr lang="en-US" dirty="0">
+              <a:solidFill>
+                <a:schemeClr val="bg1"/>
+              </a:solidFill>
+            </a:endParaRPr>
+          </a:p>
+        </p:txBody>
+      </p:sp>
+      <p:pic>
+        <p:nvPicPr>
+          <p:cNvPr id="5" name="图片 4">
+            <a:extLst>
+              <a:ext uri="{FF2B5EF4-FFF2-40B4-BE49-F238E27FC236}">
+                <a16:creationId xmlns:a16="http://schemas.microsoft.com/office/drawing/2014/main" id="{C34E52D1-07A3-46A7-95AE-20B89F04C8D7}"/>
+              </a:ext>
+            </a:extLst>
+          </p:cNvPr>
+          <p:cNvPicPr>
+            <a:picLocks noChangeAspect="1"/>
+          </p:cNvPicPr>
+          <p:nvPr/>
+        </p:nvPicPr>
+        <p:blipFill>
+          <a:blip r:embed="rId2"/>
+          <a:stretch>
+            <a:fillRect/>
+          </a:stretch>
+        </p:blipFill>
+        <p:spPr>
+          <a:xfrm>
+            <a:off x="3333750" y="4658406"/>
+            <a:ext cx="2838450" cy="504825"/>
+          </a:xfrm>
+          <a:prstGeom prst="rect">
+            <a:avLst/>
+          </a:prstGeom>
+        </p:spPr>
+      </p:pic>
+    </p:spTree>
+    <p:extLst>
+      <p:ext uri="{BB962C8B-B14F-4D97-AF65-F5344CB8AC3E}">
+        <p14:creationId xmlns:p14="http://schemas.microsoft.com/office/powerpoint/2010/main" val="3972416726"/>
+      </p:ext>
+    </p:extLst>
+  </p:cSld>
+  <p:clrMapOvr>
+    <a:masterClrMapping/>
+  </p:clrMapOvr>
+</p:sld>
+</file>
+
+<file path=ppt/slides/slide4.xml><?xml version="1.0" encoding="utf-8"?>
+<p:sld xmlns:a="http://schemas.openxmlformats.org/drawingml/2006/main" xmlns:r="http://schemas.openxmlformats.org/officeDocument/2006/relationships" xmlns:p="http://schemas.openxmlformats.org/presentationml/2006/main">
+  <p:cSld>
+    <p:bg>
+      <p:bgPr>
+        <a:solidFill>
+          <a:schemeClr val="tx1"/>
+        </a:solidFill>
+        <a:effectLst/>
+      </p:bgPr>
+    </p:bg>
     <p:spTree>
       <p:nvGrpSpPr>
         <p:cNvPr id="1" name=""/>
@@ -4788,9 +5063,17 @@
 </p:sld>
 </file>
 
-<file path=ppt/slides/slide4.xml><?xml version="1.0" encoding="utf-8"?>
+<file path=ppt/slides/slide5.xml><?xml version="1.0" encoding="utf-8"?>
 <p:sld xmlns:a="http://schemas.openxmlformats.org/drawingml/2006/main" xmlns:r="http://schemas.openxmlformats.org/officeDocument/2006/relationships" xmlns:p="http://schemas.openxmlformats.org/presentationml/2006/main">
   <p:cSld>
+    <p:bg>
+      <p:bgPr>
+        <a:solidFill>
+          <a:schemeClr val="tx1"/>
+        </a:solidFill>
+        <a:effectLst/>
+      </p:bgPr>
+    </p:bg>
     <p:spTree>
       <p:nvGrpSpPr>
         <p:cNvPr id="1" name=""/>
@@ -4997,6 +5280,98 @@
     <p:extLst>
       <p:ext uri="{BB962C8B-B14F-4D97-AF65-F5344CB8AC3E}">
         <p14:creationId xmlns:p14="http://schemas.microsoft.com/office/powerpoint/2010/main" val="3194851448"/>
+      </p:ext>
+    </p:extLst>
+  </p:cSld>
+  <p:clrMapOvr>
+    <a:masterClrMapping/>
+  </p:clrMapOvr>
+</p:sld>
+</file>
+
+<file path=ppt/slides/slide6.xml><?xml version="1.0" encoding="utf-8"?>
+<p:sld xmlns:a="http://schemas.openxmlformats.org/drawingml/2006/main" xmlns:r="http://schemas.openxmlformats.org/officeDocument/2006/relationships" xmlns:p="http://schemas.openxmlformats.org/presentationml/2006/main">
+  <p:cSld>
+    <p:bg>
+      <p:bgPr>
+        <a:solidFill>
+          <a:schemeClr val="tx1"/>
+        </a:solidFill>
+        <a:effectLst/>
+      </p:bgPr>
+    </p:bg>
+    <p:spTree>
+      <p:nvGrpSpPr>
+        <p:cNvPr id="1" name=""/>
+        <p:cNvGrpSpPr/>
+        <p:nvPr/>
+      </p:nvGrpSpPr>
+      <p:grpSpPr>
+        <a:xfrm>
+          <a:off x="0" y="0"/>
+          <a:ext cx="0" cy="0"/>
+          <a:chOff x="0" y="0"/>
+          <a:chExt cx="0" cy="0"/>
+        </a:xfrm>
+      </p:grpSpPr>
+      <p:sp>
+        <p:nvSpPr>
+          <p:cNvPr id="2" name="标题 1">
+            <a:extLst>
+              <a:ext uri="{FF2B5EF4-FFF2-40B4-BE49-F238E27FC236}">
+                <a16:creationId xmlns:a16="http://schemas.microsoft.com/office/drawing/2014/main" id="{528FCDA2-B101-48EC-95EC-5208705B636A}"/>
+              </a:ext>
+            </a:extLst>
+          </p:cNvPr>
+          <p:cNvSpPr>
+            <a:spLocks noGrp="1"/>
+          </p:cNvSpPr>
+          <p:nvPr>
+            <p:ph type="title"/>
+          </p:nvPr>
+        </p:nvSpPr>
+        <p:spPr/>
+        <p:txBody>
+          <a:bodyPr/>
+          <a:lstStyle/>
+          <a:p>
+            <a:r>
+              <a:rPr lang="en-US" altLang="zh-CN" dirty="0"/>
+              <a:t>Audio Detection</a:t>
+            </a:r>
+            <a:endParaRPr lang="en-US" dirty="0"/>
+          </a:p>
+        </p:txBody>
+      </p:sp>
+      <p:sp>
+        <p:nvSpPr>
+          <p:cNvPr id="3" name="内容占位符 2">
+            <a:extLst>
+              <a:ext uri="{FF2B5EF4-FFF2-40B4-BE49-F238E27FC236}">
+                <a16:creationId xmlns:a16="http://schemas.microsoft.com/office/drawing/2014/main" id="{094C4814-F98B-4430-B5AB-D7ED6855FA74}"/>
+              </a:ext>
+            </a:extLst>
+          </p:cNvPr>
+          <p:cNvSpPr>
+            <a:spLocks noGrp="1"/>
+          </p:cNvSpPr>
+          <p:nvPr>
+            <p:ph idx="1"/>
+          </p:nvPr>
+        </p:nvSpPr>
+        <p:spPr/>
+        <p:txBody>
+          <a:bodyPr/>
+          <a:lstStyle/>
+          <a:p>
+            <a:endParaRPr lang="en-US" dirty="0"/>
+          </a:p>
+        </p:txBody>
+      </p:sp>
+    </p:spTree>
+    <p:extLst>
+      <p:ext uri="{BB962C8B-B14F-4D97-AF65-F5344CB8AC3E}">
+        <p14:creationId xmlns:p14="http://schemas.microsoft.com/office/powerpoint/2010/main" val="3726128261"/>
       </p:ext>
     </p:extLst>
   </p:cSld>

</xml_diff>